<commit_message>
Conserto na ordem dos cenários
</commit_message>
<xml_diff>
--- a/15. Arquitetura de Negócio para cada Cenário.pptx
+++ b/15. Arquitetura de Negócio para cada Cenário.pptx
@@ -6,12 +6,12 @@
   </p:sldMasterIdLst>
   <p:sldIdLst>
     <p:sldId id="256" r:id="rId2"/>
-    <p:sldId id="257" r:id="rId3"/>
-    <p:sldId id="259" r:id="rId4"/>
-    <p:sldId id="260" r:id="rId5"/>
-    <p:sldId id="262" r:id="rId6"/>
-    <p:sldId id="263" r:id="rId7"/>
-    <p:sldId id="261" r:id="rId8"/>
+    <p:sldId id="261" r:id="rId3"/>
+    <p:sldId id="257" r:id="rId4"/>
+    <p:sldId id="259" r:id="rId5"/>
+    <p:sldId id="260" r:id="rId6"/>
+    <p:sldId id="262" r:id="rId7"/>
+    <p:sldId id="263" r:id="rId8"/>
   </p:sldIdLst>
   <p:sldSz cx="12192000" cy="6858000"/>
   <p:notesSz cx="6858000" cy="9144000"/>
@@ -3533,8 +3533,8 @@
         </p:nvSpPr>
         <p:spPr>
           <a:xfrm>
-            <a:off x="3560914" y="1903896"/>
-            <a:ext cx="1468074" cy="1384995"/>
+            <a:off x="3586082" y="1830879"/>
+            <a:ext cx="1468074" cy="1569660"/>
           </a:xfrm>
           <a:prstGeom prst="rect">
             <a:avLst/>
@@ -3558,6 +3558,16 @@
               </a:rPr>
               <a:t>Agendar manutenção</a:t>
             </a:r>
+          </a:p>
+          <a:p>
+            <a:pPr marL="228600" indent="-228600">
+              <a:buFont typeface="+mj-lt"/>
+              <a:buAutoNum type="arabicPeriod"/>
+            </a:pPr>
+            <a:endParaRPr lang="pt-BR" sz="1200" dirty="0">
+              <a:latin typeface="Times New Roman" panose="02020603050405020304" pitchFamily="18" charset="0"/>
+              <a:cs typeface="Times New Roman" panose="02020603050405020304" pitchFamily="18" charset="0"/>
+            </a:endParaRPr>
           </a:p>
           <a:p>
             <a:pPr marL="228600" indent="-228600">
@@ -4048,7 +4058,7 @@
         <p:spPr>
           <a:xfrm>
             <a:off x="836612" y="312111"/>
-            <a:ext cx="4277496" cy="675314"/>
+            <a:ext cx="4733678" cy="675314"/>
           </a:xfrm>
         </p:spPr>
         <p:txBody>
@@ -4062,7 +4072,7 @@
                 <a:latin typeface="Times New Roman" panose="02020603050405020304" pitchFamily="18" charset="0"/>
                 <a:cs typeface="Times New Roman" panose="02020603050405020304" pitchFamily="18" charset="0"/>
               </a:rPr>
-              <a:t>Cenário: Adicionar Sensor</a:t>
+              <a:t>Cenário: Agendar manutenção</a:t>
             </a:r>
           </a:p>
         </p:txBody>
@@ -4114,7 +4124,7 @@
                 <a:latin typeface="Times New Roman" panose="02020603050405020304" pitchFamily="18" charset="0"/>
                 <a:cs typeface="Times New Roman" panose="02020603050405020304" pitchFamily="18" charset="0"/>
               </a:rPr>
-              <a:t>Operador</a:t>
+              <a:t>Mecânico</a:t>
             </a:r>
           </a:p>
         </p:txBody>
@@ -4367,7 +4377,7 @@
                 <a:latin typeface="Times New Roman" panose="02020603050405020304" pitchFamily="18" charset="0"/>
                 <a:cs typeface="Times New Roman" panose="02020603050405020304" pitchFamily="18" charset="0"/>
               </a:rPr>
-              <a:t>Armazenar dados de sensores</a:t>
+              <a:t>Interromper serviços</a:t>
             </a:r>
           </a:p>
         </p:txBody>
@@ -4382,6 +4392,7 @@
             </a:extLst>
           </p:cNvPr>
           <p:cNvCxnSpPr>
+            <a:cxnSpLocks/>
             <a:stCxn id="15" idx="1"/>
             <a:endCxn id="16" idx="0"/>
           </p:cNvCxnSpPr>
@@ -4486,7 +4497,7 @@
                 <a:latin typeface="Times New Roman" panose="02020603050405020304" pitchFamily="18" charset="0"/>
                 <a:cs typeface="Times New Roman" panose="02020603050405020304" pitchFamily="18" charset="0"/>
               </a:rPr>
-              <a:t>, que terá o papel de Nó Operacional.</a:t>
+              <a:t>.</a:t>
             </a:r>
             <a:endParaRPr lang="pt-BR" sz="1100" dirty="0">
               <a:solidFill>
@@ -4511,7 +4522,7 @@
         <p:spPr>
           <a:xfrm>
             <a:off x="8275528" y="5797171"/>
-            <a:ext cx="2567031" cy="530224"/>
+            <a:ext cx="2567031" cy="645574"/>
           </a:xfrm>
           <a:prstGeom prst="round2DiagRect">
             <a:avLst/>
@@ -4551,7 +4562,7 @@
                 <a:latin typeface="Times New Roman" panose="02020603050405020304" pitchFamily="18" charset="0"/>
                 <a:cs typeface="Times New Roman" panose="02020603050405020304" pitchFamily="18" charset="0"/>
               </a:rPr>
-              <a:t>Neste cenário, o Sistema deve ser capaz (ter a ‘Capacidade’) de armazenar vários sensores ao mesmo tempo.</a:t>
+              <a:t>Neste cenário, o Sistema deve ser capaz de interromper todos os serviços no dia na manutenção agendada.</a:t>
             </a:r>
             <a:endParaRPr lang="pt-BR" sz="1100" dirty="0">
               <a:solidFill>
@@ -4647,7 +4658,7 @@
     </p:spTree>
     <p:extLst>
       <p:ext uri="{BB962C8B-B14F-4D97-AF65-F5344CB8AC3E}">
-        <p14:creationId xmlns:p14="http://schemas.microsoft.com/office/powerpoint/2010/main" val="4048278656"/>
+        <p14:creationId xmlns:p14="http://schemas.microsoft.com/office/powerpoint/2010/main" val="3003942631"/>
       </p:ext>
     </p:extLst>
   </p:cSld>
@@ -4707,7 +4718,7 @@
                 <a:latin typeface="Times New Roman" panose="02020603050405020304" pitchFamily="18" charset="0"/>
                 <a:cs typeface="Times New Roman" panose="02020603050405020304" pitchFamily="18" charset="0"/>
               </a:rPr>
-              <a:t>Cenário: Remover Sensor</a:t>
+              <a:t>Cenário: Adicionar Sensor</a:t>
             </a:r>
           </a:p>
         </p:txBody>
@@ -5012,7 +5023,7 @@
                 <a:latin typeface="Times New Roman" panose="02020603050405020304" pitchFamily="18" charset="0"/>
                 <a:cs typeface="Times New Roman" panose="02020603050405020304" pitchFamily="18" charset="0"/>
               </a:rPr>
-              <a:t>Alterar dados de sensores</a:t>
+              <a:t>Armazenar dados de sensores</a:t>
             </a:r>
           </a:p>
         </p:txBody>
@@ -5131,7 +5142,7 @@
                 <a:latin typeface="Times New Roman" panose="02020603050405020304" pitchFamily="18" charset="0"/>
                 <a:cs typeface="Times New Roman" panose="02020603050405020304" pitchFamily="18" charset="0"/>
               </a:rPr>
-              <a:t>.</a:t>
+              <a:t>, que terá o papel de Nó Operacional.</a:t>
             </a:r>
             <a:endParaRPr lang="pt-BR" sz="1100" dirty="0">
               <a:solidFill>
@@ -5196,7 +5207,7 @@
                 <a:latin typeface="Times New Roman" panose="02020603050405020304" pitchFamily="18" charset="0"/>
                 <a:cs typeface="Times New Roman" panose="02020603050405020304" pitchFamily="18" charset="0"/>
               </a:rPr>
-              <a:t>Neste cenário, o Sistema deve ter a capacidade de alterar e/ou remover quaisquer dados previamente adicionados à plataforma.</a:t>
+              <a:t>Neste cenário, o Sistema deve ser capaz (ter a ‘Capacidade’) de armazenar vários sensores ao mesmo tempo.</a:t>
             </a:r>
             <a:endParaRPr lang="pt-BR" sz="1100" dirty="0">
               <a:solidFill>
@@ -5292,7 +5303,7 @@
     </p:spTree>
     <p:extLst>
       <p:ext uri="{BB962C8B-B14F-4D97-AF65-F5344CB8AC3E}">
-        <p14:creationId xmlns:p14="http://schemas.microsoft.com/office/powerpoint/2010/main" val="1055051"/>
+        <p14:creationId xmlns:p14="http://schemas.microsoft.com/office/powerpoint/2010/main" val="4048278656"/>
       </p:ext>
     </p:extLst>
   </p:cSld>
@@ -5352,7 +5363,7 @@
                 <a:latin typeface="Times New Roman" panose="02020603050405020304" pitchFamily="18" charset="0"/>
                 <a:cs typeface="Times New Roman" panose="02020603050405020304" pitchFamily="18" charset="0"/>
               </a:rPr>
-              <a:t>Cenário: Configurar alertas</a:t>
+              <a:t>Cenário: Remover Sensor</a:t>
             </a:r>
           </a:p>
         </p:txBody>
@@ -5657,7 +5668,7 @@
                 <a:latin typeface="Times New Roman" panose="02020603050405020304" pitchFamily="18" charset="0"/>
                 <a:cs typeface="Times New Roman" panose="02020603050405020304" pitchFamily="18" charset="0"/>
               </a:rPr>
-              <a:t>Salvar métricas</a:t>
+              <a:t>Alterar dados de sensores</a:t>
             </a:r>
           </a:p>
         </p:txBody>
@@ -5801,7 +5812,7 @@
         <p:spPr>
           <a:xfrm>
             <a:off x="8275528" y="5797171"/>
-            <a:ext cx="2567031" cy="645574"/>
+            <a:ext cx="2567031" cy="530224"/>
           </a:xfrm>
           <a:prstGeom prst="round2DiagRect">
             <a:avLst/>
@@ -5841,7 +5852,7 @@
                 <a:latin typeface="Times New Roman" panose="02020603050405020304" pitchFamily="18" charset="0"/>
                 <a:cs typeface="Times New Roman" panose="02020603050405020304" pitchFamily="18" charset="0"/>
               </a:rPr>
-              <a:t>Neste cenário, o Sistema deve ter a capacidade de salvar métricas para alertar o Operador sobre diferentes eventos ocorridos com o motor.</a:t>
+              <a:t>Neste cenário, o Sistema deve ter a capacidade de alterar e/ou remover quaisquer dados previamente adicionados à plataforma.</a:t>
             </a:r>
             <a:endParaRPr lang="pt-BR" sz="1100" dirty="0">
               <a:solidFill>
@@ -5937,7 +5948,7 @@
     </p:spTree>
     <p:extLst>
       <p:ext uri="{BB962C8B-B14F-4D97-AF65-F5344CB8AC3E}">
-        <p14:creationId xmlns:p14="http://schemas.microsoft.com/office/powerpoint/2010/main" val="1230257027"/>
+        <p14:creationId xmlns:p14="http://schemas.microsoft.com/office/powerpoint/2010/main" val="1055051"/>
       </p:ext>
     </p:extLst>
   </p:cSld>
@@ -5983,21 +5994,21 @@
         <p:spPr>
           <a:xfrm>
             <a:off x="836612" y="312111"/>
-            <a:ext cx="4733678" cy="675314"/>
+            <a:ext cx="4277496" cy="675314"/>
           </a:xfrm>
         </p:spPr>
         <p:txBody>
           <a:bodyPr>
-            <a:normAutofit/>
+            <a:normAutofit fontScale="90000"/>
           </a:bodyPr>
           <a:lstStyle/>
           <a:p>
             <a:r>
-              <a:rPr lang="pt-BR" sz="2900" dirty="0">
+              <a:rPr lang="pt-BR" dirty="0">
                 <a:latin typeface="Times New Roman" panose="02020603050405020304" pitchFamily="18" charset="0"/>
                 <a:cs typeface="Times New Roman" panose="02020603050405020304" pitchFamily="18" charset="0"/>
               </a:rPr>
-              <a:t>Cenário: Ligar motor</a:t>
+              <a:t>Cenário: Configurar alertas</a:t>
             </a:r>
           </a:p>
         </p:txBody>
@@ -6302,7 +6313,7 @@
                 <a:latin typeface="Times New Roman" panose="02020603050405020304" pitchFamily="18" charset="0"/>
                 <a:cs typeface="Times New Roman" panose="02020603050405020304" pitchFamily="18" charset="0"/>
               </a:rPr>
-              <a:t>Controlar força do motor</a:t>
+              <a:t>Salvar métricas</a:t>
             </a:r>
           </a:p>
         </p:txBody>
@@ -6317,7 +6328,6 @@
             </a:extLst>
           </p:cNvPr>
           <p:cNvCxnSpPr>
-            <a:cxnSpLocks/>
             <a:stCxn id="15" idx="1"/>
             <a:endCxn id="16" idx="0"/>
           </p:cNvCxnSpPr>
@@ -6487,7 +6497,7 @@
                 <a:latin typeface="Times New Roman" panose="02020603050405020304" pitchFamily="18" charset="0"/>
                 <a:cs typeface="Times New Roman" panose="02020603050405020304" pitchFamily="18" charset="0"/>
               </a:rPr>
-              <a:t>Neste cenário, o Sistema deve ser capaz de controlar precisamente a corrente aplicada ao motor.  </a:t>
+              <a:t>Neste cenário, o Sistema deve ter a capacidade de salvar métricas para alertar o Operador sobre diferentes eventos ocorridos com o motor.</a:t>
             </a:r>
             <a:endParaRPr lang="pt-BR" sz="1100" dirty="0">
               <a:solidFill>
@@ -6583,7 +6593,7 @@
     </p:spTree>
     <p:extLst>
       <p:ext uri="{BB962C8B-B14F-4D97-AF65-F5344CB8AC3E}">
-        <p14:creationId xmlns:p14="http://schemas.microsoft.com/office/powerpoint/2010/main" val="1531543917"/>
+        <p14:creationId xmlns:p14="http://schemas.microsoft.com/office/powerpoint/2010/main" val="1230257027"/>
       </p:ext>
     </p:extLst>
   </p:cSld>
@@ -6643,7 +6653,7 @@
                 <a:latin typeface="Times New Roman" panose="02020603050405020304" pitchFamily="18" charset="0"/>
                 <a:cs typeface="Times New Roman" panose="02020603050405020304" pitchFamily="18" charset="0"/>
               </a:rPr>
-              <a:t>Cenário: Desligar motor</a:t>
+              <a:t>Cenário: Ligar motor</a:t>
             </a:r>
           </a:p>
         </p:txBody>
@@ -6948,7 +6958,7 @@
                 <a:latin typeface="Times New Roman" panose="02020603050405020304" pitchFamily="18" charset="0"/>
                 <a:cs typeface="Times New Roman" panose="02020603050405020304" pitchFamily="18" charset="0"/>
               </a:rPr>
-              <a:t>Gerenciar uso do motor </a:t>
+              <a:t>Controlar força do motor</a:t>
             </a:r>
           </a:p>
         </p:txBody>
@@ -7133,7 +7143,7 @@
                 <a:latin typeface="Times New Roman" panose="02020603050405020304" pitchFamily="18" charset="0"/>
                 <a:cs typeface="Times New Roman" panose="02020603050405020304" pitchFamily="18" charset="0"/>
               </a:rPr>
-              <a:t>Neste cenário, o Sistema deve ser capaz de controlar o uso dos motores ligados.</a:t>
+              <a:t>Neste cenário, o Sistema deve ser capaz de controlar precisamente a corrente aplicada ao motor.  </a:t>
             </a:r>
             <a:endParaRPr lang="pt-BR" sz="1100" dirty="0">
               <a:solidFill>
@@ -7229,7 +7239,7 @@
     </p:spTree>
     <p:extLst>
       <p:ext uri="{BB962C8B-B14F-4D97-AF65-F5344CB8AC3E}">
-        <p14:creationId xmlns:p14="http://schemas.microsoft.com/office/powerpoint/2010/main" val="2382149066"/>
+        <p14:creationId xmlns:p14="http://schemas.microsoft.com/office/powerpoint/2010/main" val="1531543917"/>
       </p:ext>
     </p:extLst>
   </p:cSld>
@@ -7280,16 +7290,16 @@
         </p:spPr>
         <p:txBody>
           <a:bodyPr>
-            <a:normAutofit fontScale="90000"/>
+            <a:normAutofit/>
           </a:bodyPr>
           <a:lstStyle/>
           <a:p>
             <a:r>
-              <a:rPr lang="pt-BR" dirty="0">
+              <a:rPr lang="pt-BR" sz="2900" dirty="0">
                 <a:latin typeface="Times New Roman" panose="02020603050405020304" pitchFamily="18" charset="0"/>
                 <a:cs typeface="Times New Roman" panose="02020603050405020304" pitchFamily="18" charset="0"/>
               </a:rPr>
-              <a:t>Cenário: Agendar manutenção</a:t>
+              <a:t>Cenário: Desligar motor</a:t>
             </a:r>
           </a:p>
         </p:txBody>
@@ -7341,7 +7351,7 @@
                 <a:latin typeface="Times New Roman" panose="02020603050405020304" pitchFamily="18" charset="0"/>
                 <a:cs typeface="Times New Roman" panose="02020603050405020304" pitchFamily="18" charset="0"/>
               </a:rPr>
-              <a:t>Mecânico</a:t>
+              <a:t>Operador</a:t>
             </a:r>
           </a:p>
         </p:txBody>
@@ -7594,7 +7604,7 @@
                 <a:latin typeface="Times New Roman" panose="02020603050405020304" pitchFamily="18" charset="0"/>
                 <a:cs typeface="Times New Roman" panose="02020603050405020304" pitchFamily="18" charset="0"/>
               </a:rPr>
-              <a:t>Interromper serviços</a:t>
+              <a:t>Gerenciar uso do motor </a:t>
             </a:r>
           </a:p>
         </p:txBody>
@@ -7779,7 +7789,7 @@
                 <a:latin typeface="Times New Roman" panose="02020603050405020304" pitchFamily="18" charset="0"/>
                 <a:cs typeface="Times New Roman" panose="02020603050405020304" pitchFamily="18" charset="0"/>
               </a:rPr>
-              <a:t>Neste cenário, o Sistema deve ser capaz de interromper todos os serviços no dia na manutenção agendada.</a:t>
+              <a:t>Neste cenário, o Sistema deve ser capaz de controlar o uso dos motores ligados.</a:t>
             </a:r>
             <a:endParaRPr lang="pt-BR" sz="1100" dirty="0">
               <a:solidFill>
@@ -7875,7 +7885,7 @@
     </p:spTree>
     <p:extLst>
       <p:ext uri="{BB962C8B-B14F-4D97-AF65-F5344CB8AC3E}">
-        <p14:creationId xmlns:p14="http://schemas.microsoft.com/office/powerpoint/2010/main" val="3003942631"/>
+        <p14:creationId xmlns:p14="http://schemas.microsoft.com/office/powerpoint/2010/main" val="2382149066"/>
       </p:ext>
     </p:extLst>
   </p:cSld>

</xml_diff>

<commit_message>
Artefato 17 parcialmente desenvolvido
</commit_message>
<xml_diff>
--- a/15. Arquitetura de Negócio para cada Cenário.pptx
+++ b/15. Arquitetura de Negócio para cada Cenário.pptx
@@ -6,13 +6,12 @@
   </p:sldMasterIdLst>
   <p:sldIdLst>
     <p:sldId id="256" r:id="rId2"/>
-    <p:sldId id="261" r:id="rId3"/>
-    <p:sldId id="262" r:id="rId4"/>
+    <p:sldId id="262" r:id="rId3"/>
+    <p:sldId id="261" r:id="rId4"/>
     <p:sldId id="263" r:id="rId5"/>
-    <p:sldId id="264" r:id="rId6"/>
-    <p:sldId id="265" r:id="rId7"/>
-    <p:sldId id="266" r:id="rId8"/>
-    <p:sldId id="267" r:id="rId9"/>
+    <p:sldId id="266" r:id="rId6"/>
+    <p:sldId id="264" r:id="rId7"/>
+    <p:sldId id="267" r:id="rId8"/>
   </p:sldIdLst>
   <p:sldSz cx="12192000" cy="6858000"/>
   <p:notesSz cx="6858000" cy="9144000"/>
@@ -266,7 +265,7 @@
           <a:p>
             <a:fld id="{91061947-49C0-4A18-A5C1-FE9CDF9CC641}" type="datetimeFigureOut">
               <a:rPr lang="pt-BR" smtClean="0"/>
-              <a:t>05/09/2020</a:t>
+              <a:t>06/09/2020</a:t>
             </a:fld>
             <a:endParaRPr lang="pt-BR"/>
           </a:p>
@@ -464,7 +463,7 @@
           <a:p>
             <a:fld id="{91061947-49C0-4A18-A5C1-FE9CDF9CC641}" type="datetimeFigureOut">
               <a:rPr lang="pt-BR" smtClean="0"/>
-              <a:t>05/09/2020</a:t>
+              <a:t>06/09/2020</a:t>
             </a:fld>
             <a:endParaRPr lang="pt-BR"/>
           </a:p>
@@ -672,7 +671,7 @@
           <a:p>
             <a:fld id="{91061947-49C0-4A18-A5C1-FE9CDF9CC641}" type="datetimeFigureOut">
               <a:rPr lang="pt-BR" smtClean="0"/>
-              <a:t>05/09/2020</a:t>
+              <a:t>06/09/2020</a:t>
             </a:fld>
             <a:endParaRPr lang="pt-BR"/>
           </a:p>
@@ -870,7 +869,7 @@
           <a:p>
             <a:fld id="{91061947-49C0-4A18-A5C1-FE9CDF9CC641}" type="datetimeFigureOut">
               <a:rPr lang="pt-BR" smtClean="0"/>
-              <a:t>05/09/2020</a:t>
+              <a:t>06/09/2020</a:t>
             </a:fld>
             <a:endParaRPr lang="pt-BR"/>
           </a:p>
@@ -1145,7 +1144,7 @@
           <a:p>
             <a:fld id="{91061947-49C0-4A18-A5C1-FE9CDF9CC641}" type="datetimeFigureOut">
               <a:rPr lang="pt-BR" smtClean="0"/>
-              <a:t>05/09/2020</a:t>
+              <a:t>06/09/2020</a:t>
             </a:fld>
             <a:endParaRPr lang="pt-BR"/>
           </a:p>
@@ -1410,7 +1409,7 @@
           <a:p>
             <a:fld id="{91061947-49C0-4A18-A5C1-FE9CDF9CC641}" type="datetimeFigureOut">
               <a:rPr lang="pt-BR" smtClean="0"/>
-              <a:t>05/09/2020</a:t>
+              <a:t>06/09/2020</a:t>
             </a:fld>
             <a:endParaRPr lang="pt-BR"/>
           </a:p>
@@ -1822,7 +1821,7 @@
           <a:p>
             <a:fld id="{91061947-49C0-4A18-A5C1-FE9CDF9CC641}" type="datetimeFigureOut">
               <a:rPr lang="pt-BR" smtClean="0"/>
-              <a:t>05/09/2020</a:t>
+              <a:t>06/09/2020</a:t>
             </a:fld>
             <a:endParaRPr lang="pt-BR"/>
           </a:p>
@@ -1963,7 +1962,7 @@
           <a:p>
             <a:fld id="{91061947-49C0-4A18-A5C1-FE9CDF9CC641}" type="datetimeFigureOut">
               <a:rPr lang="pt-BR" smtClean="0"/>
-              <a:t>05/09/2020</a:t>
+              <a:t>06/09/2020</a:t>
             </a:fld>
             <a:endParaRPr lang="pt-BR"/>
           </a:p>
@@ -2076,7 +2075,7 @@
           <a:p>
             <a:fld id="{91061947-49C0-4A18-A5C1-FE9CDF9CC641}" type="datetimeFigureOut">
               <a:rPr lang="pt-BR" smtClean="0"/>
-              <a:t>05/09/2020</a:t>
+              <a:t>06/09/2020</a:t>
             </a:fld>
             <a:endParaRPr lang="pt-BR"/>
           </a:p>
@@ -2387,7 +2386,7 @@
           <a:p>
             <a:fld id="{91061947-49C0-4A18-A5C1-FE9CDF9CC641}" type="datetimeFigureOut">
               <a:rPr lang="pt-BR" smtClean="0"/>
-              <a:t>05/09/2020</a:t>
+              <a:t>06/09/2020</a:t>
             </a:fld>
             <a:endParaRPr lang="pt-BR"/>
           </a:p>
@@ -2675,7 +2674,7 @@
           <a:p>
             <a:fld id="{91061947-49C0-4A18-A5C1-FE9CDF9CC641}" type="datetimeFigureOut">
               <a:rPr lang="pt-BR" smtClean="0"/>
-              <a:t>05/09/2020</a:t>
+              <a:t>06/09/2020</a:t>
             </a:fld>
             <a:endParaRPr lang="pt-BR"/>
           </a:p>
@@ -2916,7 +2915,7 @@
           <a:p>
             <a:fld id="{91061947-49C0-4A18-A5C1-FE9CDF9CC641}" type="datetimeFigureOut">
               <a:rPr lang="pt-BR" smtClean="0"/>
-              <a:t>05/09/2020</a:t>
+              <a:t>06/09/2020</a:t>
             </a:fld>
             <a:endParaRPr lang="pt-BR"/>
           </a:p>
@@ -3788,7 +3787,7 @@
         <p:spPr>
           <a:xfrm>
             <a:off x="4331825" y="1577243"/>
-            <a:ext cx="1654620" cy="1200329"/>
+            <a:ext cx="1654620" cy="1015663"/>
           </a:xfrm>
           <a:prstGeom prst="rect">
             <a:avLst/>
@@ -3800,6 +3799,19 @@
             <a:spAutoFit/>
           </a:bodyPr>
           <a:lstStyle/>
+          <a:p>
+            <a:pPr marL="228600" indent="-228600">
+              <a:buFont typeface="+mj-lt"/>
+              <a:buAutoNum type="arabicPeriod"/>
+            </a:pPr>
+            <a:r>
+              <a:rPr lang="pt-BR" sz="1200" dirty="0">
+                <a:latin typeface="Times New Roman" panose="02020603050405020304" pitchFamily="18" charset="0"/>
+                <a:cs typeface="Times New Roman" panose="02020603050405020304" pitchFamily="18" charset="0"/>
+              </a:rPr>
+              <a:t>Fornecer orçamento</a:t>
+            </a:r>
+          </a:p>
           <a:p>
             <a:pPr marL="228600" indent="-228600">
               <a:buFont typeface="+mj-lt"/>
@@ -3811,19 +3823,6 @@
                 <a:cs typeface="Times New Roman" panose="02020603050405020304" pitchFamily="18" charset="0"/>
               </a:rPr>
               <a:t>Fornecer peças</a:t>
-            </a:r>
-          </a:p>
-          <a:p>
-            <a:pPr marL="228600" indent="-228600">
-              <a:buFont typeface="+mj-lt"/>
-              <a:buAutoNum type="arabicPeriod"/>
-            </a:pPr>
-            <a:r>
-              <a:rPr lang="pt-BR" sz="1200" dirty="0">
-                <a:latin typeface="Times New Roman" panose="02020603050405020304" pitchFamily="18" charset="0"/>
-                <a:cs typeface="Times New Roman" panose="02020603050405020304" pitchFamily="18" charset="0"/>
-              </a:rPr>
-              <a:t>Fornecer orçamento</a:t>
             </a:r>
           </a:p>
           <a:p>
@@ -3859,45 +3858,54 @@
               <a:cs typeface="Times New Roman" panose="02020603050405020304" pitchFamily="18" charset="0"/>
             </a:endParaRPr>
           </a:p>
-          <a:p>
-            <a:pPr marL="228600" indent="-228600">
-              <a:buFont typeface="+mj-lt"/>
-              <a:buAutoNum type="arabicPeriod"/>
-            </a:pPr>
+        </p:txBody>
+      </p:sp>
+      <p:sp>
+        <p:nvSpPr>
+          <p:cNvPr id="33" name="CaixaDeTexto 32">
+            <a:extLst>
+              <a:ext uri="{FF2B5EF4-FFF2-40B4-BE49-F238E27FC236}">
+                <a16:creationId xmlns:a16="http://schemas.microsoft.com/office/drawing/2014/main" id="{5F95A2A9-8976-4795-9413-A8A849A3F5F7}"/>
+              </a:ext>
+            </a:extLst>
+          </p:cNvPr>
+          <p:cNvSpPr txBox="1"/>
+          <p:nvPr/>
+        </p:nvSpPr>
+        <p:spPr>
+          <a:xfrm>
+            <a:off x="4331825" y="3982022"/>
+            <a:ext cx="1481496" cy="1200329"/>
+          </a:xfrm>
+          <a:prstGeom prst="rect">
+            <a:avLst/>
+          </a:prstGeom>
+          <a:noFill/>
+        </p:spPr>
+        <p:txBody>
+          <a:bodyPr wrap="none" rtlCol="0">
+            <a:spAutoFit/>
+          </a:bodyPr>
+          <a:lstStyle/>
+          <a:p>
             <a:endParaRPr lang="pt-BR" sz="1200" dirty="0">
               <a:latin typeface="Times New Roman" panose="02020603050405020304" pitchFamily="18" charset="0"/>
               <a:cs typeface="Times New Roman" panose="02020603050405020304" pitchFamily="18" charset="0"/>
             </a:endParaRPr>
           </a:p>
-        </p:txBody>
-      </p:sp>
-      <p:sp>
-        <p:nvSpPr>
-          <p:cNvPr id="33" name="CaixaDeTexto 32">
-            <a:extLst>
-              <a:ext uri="{FF2B5EF4-FFF2-40B4-BE49-F238E27FC236}">
-                <a16:creationId xmlns:a16="http://schemas.microsoft.com/office/drawing/2014/main" id="{5F95A2A9-8976-4795-9413-A8A849A3F5F7}"/>
-              </a:ext>
-            </a:extLst>
-          </p:cNvPr>
-          <p:cNvSpPr txBox="1"/>
-          <p:nvPr/>
-        </p:nvSpPr>
-        <p:spPr>
-          <a:xfrm>
-            <a:off x="4331825" y="4167700"/>
-            <a:ext cx="1544012" cy="1200329"/>
-          </a:xfrm>
-          <a:prstGeom prst="rect">
-            <a:avLst/>
-          </a:prstGeom>
-          <a:noFill/>
-        </p:spPr>
-        <p:txBody>
-          <a:bodyPr wrap="none" rtlCol="0">
-            <a:spAutoFit/>
-          </a:bodyPr>
-          <a:lstStyle/>
+          <a:p>
+            <a:pPr marL="228600" indent="-228600">
+              <a:buFont typeface="+mj-lt"/>
+              <a:buAutoNum type="arabicPeriod" startAt="4"/>
+            </a:pPr>
+            <a:r>
+              <a:rPr lang="pt-BR" sz="1200" dirty="0">
+                <a:latin typeface="Times New Roman" panose="02020603050405020304" pitchFamily="18" charset="0"/>
+                <a:cs typeface="Times New Roman" panose="02020603050405020304" pitchFamily="18" charset="0"/>
+              </a:rPr>
+              <a:t>Obter orçamento</a:t>
+            </a:r>
+          </a:p>
           <a:p>
             <a:pPr marL="228600" indent="-228600">
               <a:buFont typeface="+mj-lt"/>
@@ -3909,32 +3917,6 @@
                 <a:cs typeface="Times New Roman" panose="02020603050405020304" pitchFamily="18" charset="0"/>
               </a:rPr>
               <a:t>Comprar produto</a:t>
-            </a:r>
-          </a:p>
-          <a:p>
-            <a:pPr marL="228600" indent="-228600">
-              <a:buFont typeface="+mj-lt"/>
-              <a:buAutoNum type="arabicPeriod" startAt="4"/>
-            </a:pPr>
-            <a:r>
-              <a:rPr lang="pt-BR" sz="1200" dirty="0">
-                <a:latin typeface="Times New Roman" panose="02020603050405020304" pitchFamily="18" charset="0"/>
-                <a:cs typeface="Times New Roman" panose="02020603050405020304" pitchFamily="18" charset="0"/>
-              </a:rPr>
-              <a:t>Obter treinamento</a:t>
-            </a:r>
-          </a:p>
-          <a:p>
-            <a:pPr marL="228600" indent="-228600">
-              <a:buFont typeface="+mj-lt"/>
-              <a:buAutoNum type="arabicPeriod" startAt="4"/>
-            </a:pPr>
-            <a:r>
-              <a:rPr lang="pt-BR" sz="1200" dirty="0">
-                <a:latin typeface="Times New Roman" panose="02020603050405020304" pitchFamily="18" charset="0"/>
-                <a:cs typeface="Times New Roman" panose="02020603050405020304" pitchFamily="18" charset="0"/>
-              </a:rPr>
-              <a:t>Obter orçamento</a:t>
             </a:r>
           </a:p>
           <a:p>
@@ -4031,7 +4013,7 @@
                 <a:latin typeface="Times New Roman" panose="02020603050405020304" pitchFamily="18" charset="0"/>
                 <a:cs typeface="Times New Roman" panose="02020603050405020304" pitchFamily="18" charset="0"/>
               </a:rPr>
-              <a:t>Cenário: Fornecer peças</a:t>
+              <a:t>Cenário: Fornecer orçamento</a:t>
             </a:r>
           </a:p>
         </p:txBody>
@@ -4319,7 +4301,7 @@
                 <a:latin typeface="Times New Roman" panose="02020603050405020304" pitchFamily="18" charset="0"/>
                 <a:cs typeface="Times New Roman" panose="02020603050405020304" pitchFamily="18" charset="0"/>
               </a:rPr>
-              <a:t>Receber e armazenar peças</a:t>
+              <a:t>Analisar orçamento</a:t>
             </a:r>
           </a:p>
         </p:txBody>
@@ -4484,7 +4466,7 @@
                 <a:latin typeface="Times New Roman" panose="02020603050405020304" pitchFamily="18" charset="0"/>
                 <a:cs typeface="Times New Roman" panose="02020603050405020304" pitchFamily="18" charset="0"/>
               </a:rPr>
-              <a:t>Neste cenário, o Nó Operacional deve ter a capacidade de receber e armazenar as peças fornecidas.</a:t>
+              <a:t>Neste cenário, o Nó Operacional deve ter a capacidade de analisar o orçamento recebido.</a:t>
             </a:r>
             <a:endParaRPr lang="pt-BR" sz="1100" dirty="0">
               <a:solidFill>
@@ -4580,7 +4562,7 @@
     </p:spTree>
     <p:extLst>
       <p:ext uri="{BB962C8B-B14F-4D97-AF65-F5344CB8AC3E}">
-        <p14:creationId xmlns:p14="http://schemas.microsoft.com/office/powerpoint/2010/main" val="3003942631"/>
+        <p14:creationId xmlns:p14="http://schemas.microsoft.com/office/powerpoint/2010/main" val="4181233596"/>
       </p:ext>
     </p:extLst>
   </p:cSld>
@@ -4640,7 +4622,7 @@
                 <a:latin typeface="Times New Roman" panose="02020603050405020304" pitchFamily="18" charset="0"/>
                 <a:cs typeface="Times New Roman" panose="02020603050405020304" pitchFamily="18" charset="0"/>
               </a:rPr>
-              <a:t>Cenário: Fornecer orçamento</a:t>
+              <a:t>Cenário: Fornecer peças</a:t>
             </a:r>
           </a:p>
         </p:txBody>
@@ -4928,7 +4910,7 @@
                 <a:latin typeface="Times New Roman" panose="02020603050405020304" pitchFamily="18" charset="0"/>
                 <a:cs typeface="Times New Roman" panose="02020603050405020304" pitchFamily="18" charset="0"/>
               </a:rPr>
-              <a:t>Analisar orçamento</a:t>
+              <a:t>Receber e armazenar peças</a:t>
             </a:r>
           </a:p>
         </p:txBody>
@@ -5093,7 +5075,7 @@
                 <a:latin typeface="Times New Roman" panose="02020603050405020304" pitchFamily="18" charset="0"/>
                 <a:cs typeface="Times New Roman" panose="02020603050405020304" pitchFamily="18" charset="0"/>
               </a:rPr>
-              <a:t>Neste cenário, o Nó Operacional deve ter a capacidade de analisar o orçamento recebido.</a:t>
+              <a:t>Neste cenário, o Nó Operacional deve ter a capacidade de receber e armazenar as peças fornecidas.</a:t>
             </a:r>
             <a:endParaRPr lang="pt-BR" sz="1100" dirty="0">
               <a:solidFill>
@@ -5189,7 +5171,7 @@
     </p:spTree>
     <p:extLst>
       <p:ext uri="{BB962C8B-B14F-4D97-AF65-F5344CB8AC3E}">
-        <p14:creationId xmlns:p14="http://schemas.microsoft.com/office/powerpoint/2010/main" val="4181233596"/>
+        <p14:creationId xmlns:p14="http://schemas.microsoft.com/office/powerpoint/2010/main" val="3003942631"/>
       </p:ext>
     </p:extLst>
   </p:cSld>
@@ -5537,7 +5519,7 @@
                 <a:latin typeface="Times New Roman" panose="02020603050405020304" pitchFamily="18" charset="0"/>
                 <a:cs typeface="Times New Roman" panose="02020603050405020304" pitchFamily="18" charset="0"/>
               </a:rPr>
-              <a:t>Enviar peça defeituosa</a:t>
+              <a:t>Identificar peças defeituosas</a:t>
             </a:r>
           </a:p>
         </p:txBody>
@@ -5858,7 +5840,7 @@
                 <a:latin typeface="Times New Roman" panose="02020603050405020304" pitchFamily="18" charset="0"/>
                 <a:cs typeface="Times New Roman" panose="02020603050405020304" pitchFamily="18" charset="0"/>
               </a:rPr>
-              <a:t>Cenário: Comprar produto</a:t>
+              <a:t>Cenário: Obter orçamento</a:t>
             </a:r>
           </a:p>
         </p:txBody>
@@ -6146,7 +6128,7 @@
                 <a:latin typeface="Times New Roman" panose="02020603050405020304" pitchFamily="18" charset="0"/>
                 <a:cs typeface="Times New Roman" panose="02020603050405020304" pitchFamily="18" charset="0"/>
               </a:rPr>
-              <a:t>Fornecer produto</a:t>
+              <a:t>Gerir orçamentos</a:t>
             </a:r>
           </a:p>
         </p:txBody>
@@ -6311,7 +6293,7 @@
                 <a:latin typeface="Times New Roman" panose="02020603050405020304" pitchFamily="18" charset="0"/>
                 <a:cs typeface="Times New Roman" panose="02020603050405020304" pitchFamily="18" charset="0"/>
               </a:rPr>
-              <a:t>Neste cenário, a Área Comercial deve ter a capacidade de vender o produto ao cliente.</a:t>
+              <a:t>Neste cenário, a Área Comercial deve ter a capacidade de gerir seus orçamentos criados.</a:t>
             </a:r>
             <a:endParaRPr lang="pt-BR" sz="1100" dirty="0">
               <a:solidFill>
@@ -6407,7 +6389,7 @@
     </p:spTree>
     <p:extLst>
       <p:ext uri="{BB962C8B-B14F-4D97-AF65-F5344CB8AC3E}">
-        <p14:creationId xmlns:p14="http://schemas.microsoft.com/office/powerpoint/2010/main" val="1136400612"/>
+        <p14:creationId xmlns:p14="http://schemas.microsoft.com/office/powerpoint/2010/main" val="2595377238"/>
       </p:ext>
     </p:extLst>
   </p:cSld>
@@ -6467,7 +6449,7 @@
                 <a:latin typeface="Times New Roman" panose="02020603050405020304" pitchFamily="18" charset="0"/>
                 <a:cs typeface="Times New Roman" panose="02020603050405020304" pitchFamily="18" charset="0"/>
               </a:rPr>
-              <a:t>Cenário: Obter treinamento</a:t>
+              <a:t>Cenário: Comprar produto</a:t>
             </a:r>
           </a:p>
         </p:txBody>
@@ -6670,14 +6652,14 @@
           <a:p>
             <a:pPr algn="ctr"/>
             <a:r>
-              <a:rPr lang="pt-BR" sz="1050" dirty="0">
+              <a:rPr lang="pt-BR" sz="1400" dirty="0">
                 <a:solidFill>
                   <a:schemeClr val="tx1"/>
                 </a:solidFill>
                 <a:latin typeface="Times New Roman" panose="02020603050405020304" pitchFamily="18" charset="0"/>
                 <a:cs typeface="Times New Roman" panose="02020603050405020304" pitchFamily="18" charset="0"/>
               </a:rPr>
-              <a:t>Centro de Treinamento de Clientes</a:t>
+              <a:t>Área Comercial</a:t>
             </a:r>
           </a:p>
           <a:p>
@@ -6755,7 +6737,7 @@
                 <a:latin typeface="Times New Roman" panose="02020603050405020304" pitchFamily="18" charset="0"/>
                 <a:cs typeface="Times New Roman" panose="02020603050405020304" pitchFamily="18" charset="0"/>
               </a:rPr>
-              <a:t>Treinar cliente</a:t>
+              <a:t>Fornecer produto</a:t>
             </a:r>
           </a:p>
         </p:txBody>
@@ -6855,7 +6837,7 @@
                 <a:latin typeface="Times New Roman" panose="02020603050405020304" pitchFamily="18" charset="0"/>
                 <a:cs typeface="Times New Roman" panose="02020603050405020304" pitchFamily="18" charset="0"/>
               </a:rPr>
-              <a:t>Neste cenário, o Cliente irá interagir com o CTC da WEG.</a:t>
+              <a:t>Neste cenário, o Cliente irá interagir com a Área Comercial da WEG.</a:t>
             </a:r>
             <a:endParaRPr lang="pt-BR" sz="1100" dirty="0">
               <a:solidFill>
@@ -6920,7 +6902,7 @@
                 <a:latin typeface="Times New Roman" panose="02020603050405020304" pitchFamily="18" charset="0"/>
                 <a:cs typeface="Times New Roman" panose="02020603050405020304" pitchFamily="18" charset="0"/>
               </a:rPr>
-              <a:t>Neste cenário, a Área Comercial deve ter a capacidade de treinar o cliente.</a:t>
+              <a:t>Neste cenário, a Área Comercial deve ter a capacidade de vender o produto ao cliente.</a:t>
             </a:r>
             <a:endParaRPr lang="pt-BR" sz="1100" dirty="0">
               <a:solidFill>
@@ -7016,7 +6998,7 @@
     </p:spTree>
     <p:extLst>
       <p:ext uri="{BB962C8B-B14F-4D97-AF65-F5344CB8AC3E}">
-        <p14:creationId xmlns:p14="http://schemas.microsoft.com/office/powerpoint/2010/main" val="3941372438"/>
+        <p14:creationId xmlns:p14="http://schemas.microsoft.com/office/powerpoint/2010/main" val="1136400612"/>
       </p:ext>
     </p:extLst>
   </p:cSld>
@@ -7027,615 +7009,6 @@
 </file>
 
 <file path=ppt/slides/slide7.xml><?xml version="1.0" encoding="utf-8"?>
-<p:sld xmlns:a="http://schemas.openxmlformats.org/drawingml/2006/main" xmlns:r="http://schemas.openxmlformats.org/officeDocument/2006/relationships" xmlns:p="http://schemas.openxmlformats.org/presentationml/2006/main">
-  <p:cSld>
-    <p:spTree>
-      <p:nvGrpSpPr>
-        <p:cNvPr id="1" name=""/>
-        <p:cNvGrpSpPr/>
-        <p:nvPr/>
-      </p:nvGrpSpPr>
-      <p:grpSpPr>
-        <a:xfrm>
-          <a:off x="0" y="0"/>
-          <a:ext cx="0" cy="0"/>
-          <a:chOff x="0" y="0"/>
-          <a:chExt cx="0" cy="0"/>
-        </a:xfrm>
-      </p:grpSpPr>
-      <p:sp>
-        <p:nvSpPr>
-          <p:cNvPr id="2" name="Título 1">
-            <a:extLst>
-              <a:ext uri="{FF2B5EF4-FFF2-40B4-BE49-F238E27FC236}">
-                <a16:creationId xmlns:a16="http://schemas.microsoft.com/office/drawing/2014/main" id="{2FA7BBE2-E3E6-4927-88EE-44F284358DB4}"/>
-              </a:ext>
-            </a:extLst>
-          </p:cNvPr>
-          <p:cNvSpPr>
-            <a:spLocks noGrp="1"/>
-          </p:cNvSpPr>
-          <p:nvPr>
-            <p:ph type="title"/>
-          </p:nvPr>
-        </p:nvSpPr>
-        <p:spPr>
-          <a:xfrm>
-            <a:off x="836612" y="312111"/>
-            <a:ext cx="4733678" cy="675314"/>
-          </a:xfrm>
-        </p:spPr>
-        <p:txBody>
-          <a:bodyPr>
-            <a:normAutofit/>
-          </a:bodyPr>
-          <a:lstStyle/>
-          <a:p>
-            <a:r>
-              <a:rPr lang="pt-BR" sz="2900" dirty="0">
-                <a:latin typeface="Times New Roman" panose="02020603050405020304" pitchFamily="18" charset="0"/>
-                <a:cs typeface="Times New Roman" panose="02020603050405020304" pitchFamily="18" charset="0"/>
-              </a:rPr>
-              <a:t>Cenário: Obter orçamento</a:t>
-            </a:r>
-          </a:p>
-        </p:txBody>
-      </p:sp>
-      <p:sp>
-        <p:nvSpPr>
-          <p:cNvPr id="5" name="Retângulo: Cantos Arredondados 4">
-            <a:extLst>
-              <a:ext uri="{FF2B5EF4-FFF2-40B4-BE49-F238E27FC236}">
-                <a16:creationId xmlns:a16="http://schemas.microsoft.com/office/drawing/2014/main" id="{971A8EAA-21DE-467D-997E-DE146E928597}"/>
-              </a:ext>
-            </a:extLst>
-          </p:cNvPr>
-          <p:cNvSpPr/>
-          <p:nvPr/>
-        </p:nvSpPr>
-        <p:spPr>
-          <a:xfrm>
-            <a:off x="1619075" y="2984384"/>
-            <a:ext cx="1356285" cy="889232"/>
-          </a:xfrm>
-          <a:prstGeom prst="roundRect">
-            <a:avLst/>
-          </a:prstGeom>
-        </p:spPr>
-        <p:style>
-          <a:lnRef idx="2">
-            <a:schemeClr val="accent1">
-              <a:shade val="50000"/>
-            </a:schemeClr>
-          </a:lnRef>
-          <a:fillRef idx="1">
-            <a:schemeClr val="accent1"/>
-          </a:fillRef>
-          <a:effectRef idx="0">
-            <a:schemeClr val="accent1"/>
-          </a:effectRef>
-          <a:fontRef idx="minor">
-            <a:schemeClr val="lt1"/>
-          </a:fontRef>
-        </p:style>
-        <p:txBody>
-          <a:bodyPr rtlCol="0" anchor="ctr"/>
-          <a:lstStyle/>
-          <a:p>
-            <a:pPr algn="ctr"/>
-            <a:r>
-              <a:rPr lang="pt-BR" sz="1400" dirty="0">
-                <a:latin typeface="Times New Roman" panose="02020603050405020304" pitchFamily="18" charset="0"/>
-                <a:cs typeface="Times New Roman" panose="02020603050405020304" pitchFamily="18" charset="0"/>
-              </a:rPr>
-              <a:t>Cliente</a:t>
-            </a:r>
-          </a:p>
-        </p:txBody>
-      </p:sp>
-      <p:sp>
-        <p:nvSpPr>
-          <p:cNvPr id="6" name="Retângulo: Cantos Arredondados 5">
-            <a:extLst>
-              <a:ext uri="{FF2B5EF4-FFF2-40B4-BE49-F238E27FC236}">
-                <a16:creationId xmlns:a16="http://schemas.microsoft.com/office/drawing/2014/main" id="{B5983175-52B6-41ED-9463-0E7165CEADF8}"/>
-              </a:ext>
-            </a:extLst>
-          </p:cNvPr>
-          <p:cNvSpPr/>
-          <p:nvPr/>
-        </p:nvSpPr>
-        <p:spPr>
-          <a:xfrm>
-            <a:off x="6096000" y="2233569"/>
-            <a:ext cx="3280096" cy="2390862"/>
-          </a:xfrm>
-          <a:prstGeom prst="roundRect">
-            <a:avLst/>
-          </a:prstGeom>
-          <a:solidFill>
-            <a:schemeClr val="bg1"/>
-          </a:solidFill>
-        </p:spPr>
-        <p:style>
-          <a:lnRef idx="2">
-            <a:schemeClr val="accent1">
-              <a:shade val="50000"/>
-            </a:schemeClr>
-          </a:lnRef>
-          <a:fillRef idx="1">
-            <a:schemeClr val="accent1"/>
-          </a:fillRef>
-          <a:effectRef idx="0">
-            <a:schemeClr val="accent1"/>
-          </a:effectRef>
-          <a:fontRef idx="minor">
-            <a:schemeClr val="lt1"/>
-          </a:fontRef>
-        </p:style>
-        <p:txBody>
-          <a:bodyPr rtlCol="0" anchor="t"/>
-          <a:lstStyle/>
-          <a:p>
-            <a:pPr algn="ctr"/>
-            <a:r>
-              <a:rPr lang="pt-BR" sz="1400" dirty="0">
-                <a:solidFill>
-                  <a:schemeClr val="tx1"/>
-                </a:solidFill>
-                <a:latin typeface="Times New Roman" panose="02020603050405020304" pitchFamily="18" charset="0"/>
-                <a:cs typeface="Times New Roman" panose="02020603050405020304" pitchFamily="18" charset="0"/>
-              </a:rPr>
-              <a:t>WEG</a:t>
-            </a:r>
-          </a:p>
-        </p:txBody>
-      </p:sp>
-      <p:cxnSp>
-        <p:nvCxnSpPr>
-          <p:cNvPr id="8" name="Conector reto 7">
-            <a:extLst>
-              <a:ext uri="{FF2B5EF4-FFF2-40B4-BE49-F238E27FC236}">
-                <a16:creationId xmlns:a16="http://schemas.microsoft.com/office/drawing/2014/main" id="{0A37886D-C7CF-41B7-B719-1CFC471229A7}"/>
-              </a:ext>
-            </a:extLst>
-          </p:cNvPr>
-          <p:cNvCxnSpPr>
-            <a:stCxn id="5" idx="3"/>
-            <a:endCxn id="6" idx="1"/>
-          </p:cNvCxnSpPr>
-          <p:nvPr/>
-        </p:nvCxnSpPr>
-        <p:spPr>
-          <a:xfrm>
-            <a:off x="2975360" y="3429000"/>
-            <a:ext cx="3120640" cy="0"/>
-          </a:xfrm>
-          <a:prstGeom prst="line">
-            <a:avLst/>
-          </a:prstGeom>
-        </p:spPr>
-        <p:style>
-          <a:lnRef idx="1">
-            <a:schemeClr val="accent1"/>
-          </a:lnRef>
-          <a:fillRef idx="0">
-            <a:schemeClr val="accent1"/>
-          </a:fillRef>
-          <a:effectRef idx="0">
-            <a:schemeClr val="accent1"/>
-          </a:effectRef>
-          <a:fontRef idx="minor">
-            <a:schemeClr val="tx1"/>
-          </a:fontRef>
-        </p:style>
-      </p:cxnSp>
-      <p:sp>
-        <p:nvSpPr>
-          <p:cNvPr id="15" name="Retângulo: Cantos Diagonais Recortados 14">
-            <a:extLst>
-              <a:ext uri="{FF2B5EF4-FFF2-40B4-BE49-F238E27FC236}">
-                <a16:creationId xmlns:a16="http://schemas.microsoft.com/office/drawing/2014/main" id="{1A7F386A-DDEA-4CCF-83D4-463EC2ACD90B}"/>
-              </a:ext>
-            </a:extLst>
-          </p:cNvPr>
-          <p:cNvSpPr/>
-          <p:nvPr/>
-        </p:nvSpPr>
-        <p:spPr>
-          <a:xfrm>
-            <a:off x="6835995" y="2764180"/>
-            <a:ext cx="1800105" cy="597708"/>
-          </a:xfrm>
-          <a:prstGeom prst="snip2DiagRect">
-            <a:avLst/>
-          </a:prstGeom>
-          <a:solidFill>
-            <a:schemeClr val="accent5">
-              <a:lumMod val="60000"/>
-              <a:lumOff val="40000"/>
-            </a:schemeClr>
-          </a:solidFill>
-        </p:spPr>
-        <p:style>
-          <a:lnRef idx="2">
-            <a:schemeClr val="accent1">
-              <a:shade val="50000"/>
-            </a:schemeClr>
-          </a:lnRef>
-          <a:fillRef idx="1">
-            <a:schemeClr val="accent1"/>
-          </a:fillRef>
-          <a:effectRef idx="0">
-            <a:schemeClr val="accent1"/>
-          </a:effectRef>
-          <a:fontRef idx="minor">
-            <a:schemeClr val="lt1"/>
-          </a:fontRef>
-        </p:style>
-        <p:txBody>
-          <a:bodyPr rtlCol="0" anchor="ctr"/>
-          <a:lstStyle/>
-          <a:p>
-            <a:pPr algn="ctr"/>
-            <a:r>
-              <a:rPr lang="pt-BR" sz="1050" dirty="0">
-                <a:solidFill>
-                  <a:schemeClr val="tx1"/>
-                </a:solidFill>
-                <a:latin typeface="Times New Roman" panose="02020603050405020304" pitchFamily="18" charset="0"/>
-                <a:cs typeface="Times New Roman" panose="02020603050405020304" pitchFamily="18" charset="0"/>
-              </a:rPr>
-              <a:t>Área Comercial</a:t>
-            </a:r>
-          </a:p>
-          <a:p>
-            <a:pPr algn="ctr"/>
-            <a:r>
-              <a:rPr lang="pt-BR" sz="1050" dirty="0">
-                <a:solidFill>
-                  <a:schemeClr val="tx1"/>
-                </a:solidFill>
-                <a:latin typeface="Times New Roman" panose="02020603050405020304" pitchFamily="18" charset="0"/>
-                <a:cs typeface="Times New Roman" panose="02020603050405020304" pitchFamily="18" charset="0"/>
-              </a:rPr>
-              <a:t>(Nó operacional)</a:t>
-            </a:r>
-            <a:endParaRPr lang="pt-BR" sz="1000" dirty="0">
-              <a:solidFill>
-                <a:schemeClr val="tx1"/>
-              </a:solidFill>
-              <a:latin typeface="Times New Roman" panose="02020603050405020304" pitchFamily="18" charset="0"/>
-              <a:cs typeface="Times New Roman" panose="02020603050405020304" pitchFamily="18" charset="0"/>
-            </a:endParaRPr>
-          </a:p>
-        </p:txBody>
-      </p:sp>
-      <p:sp>
-        <p:nvSpPr>
-          <p:cNvPr id="16" name="Fluxograma: Terminação 15">
-            <a:extLst>
-              <a:ext uri="{FF2B5EF4-FFF2-40B4-BE49-F238E27FC236}">
-                <a16:creationId xmlns:a16="http://schemas.microsoft.com/office/drawing/2014/main" id="{CBD98FA4-5BF4-447C-B683-119F1FBE45F3}"/>
-              </a:ext>
-            </a:extLst>
-          </p:cNvPr>
-          <p:cNvSpPr/>
-          <p:nvPr/>
-        </p:nvSpPr>
-        <p:spPr>
-          <a:xfrm>
-            <a:off x="7027875" y="3892499"/>
-            <a:ext cx="1416343" cy="528506"/>
-          </a:xfrm>
-          <a:prstGeom prst="flowChartTerminator">
-            <a:avLst/>
-          </a:prstGeom>
-          <a:solidFill>
-            <a:srgbClr val="00B0F0"/>
-          </a:solidFill>
-        </p:spPr>
-        <p:style>
-          <a:lnRef idx="2">
-            <a:schemeClr val="accent1">
-              <a:shade val="50000"/>
-            </a:schemeClr>
-          </a:lnRef>
-          <a:fillRef idx="1">
-            <a:schemeClr val="accent1"/>
-          </a:fillRef>
-          <a:effectRef idx="0">
-            <a:schemeClr val="accent1"/>
-          </a:effectRef>
-          <a:fontRef idx="minor">
-            <a:schemeClr val="lt1"/>
-          </a:fontRef>
-        </p:style>
-        <p:txBody>
-          <a:bodyPr rtlCol="0" anchor="ctr"/>
-          <a:lstStyle/>
-          <a:p>
-            <a:pPr algn="ctr"/>
-            <a:r>
-              <a:rPr lang="pt-BR" sz="1200" dirty="0">
-                <a:solidFill>
-                  <a:schemeClr val="tx1"/>
-                </a:solidFill>
-                <a:latin typeface="Times New Roman" panose="02020603050405020304" pitchFamily="18" charset="0"/>
-                <a:cs typeface="Times New Roman" panose="02020603050405020304" pitchFamily="18" charset="0"/>
-              </a:rPr>
-              <a:t>Avaliar cliente</a:t>
-            </a:r>
-          </a:p>
-        </p:txBody>
-      </p:sp>
-      <p:cxnSp>
-        <p:nvCxnSpPr>
-          <p:cNvPr id="18" name="Conector reto 17">
-            <a:extLst>
-              <a:ext uri="{FF2B5EF4-FFF2-40B4-BE49-F238E27FC236}">
-                <a16:creationId xmlns:a16="http://schemas.microsoft.com/office/drawing/2014/main" id="{DC62D58E-FEAD-4245-A8F7-F44DDBA97263}"/>
-              </a:ext>
-            </a:extLst>
-          </p:cNvPr>
-          <p:cNvCxnSpPr>
-            <a:cxnSpLocks/>
-            <a:stCxn id="15" idx="1"/>
-            <a:endCxn id="16" idx="0"/>
-          </p:cNvCxnSpPr>
-          <p:nvPr/>
-        </p:nvCxnSpPr>
-        <p:spPr>
-          <a:xfrm flipH="1">
-            <a:off x="7736047" y="3361888"/>
-            <a:ext cx="1" cy="530611"/>
-          </a:xfrm>
-          <a:prstGeom prst="line">
-            <a:avLst/>
-          </a:prstGeom>
-        </p:spPr>
-        <p:style>
-          <a:lnRef idx="1">
-            <a:schemeClr val="accent1"/>
-          </a:lnRef>
-          <a:fillRef idx="0">
-            <a:schemeClr val="accent1"/>
-          </a:fillRef>
-          <a:effectRef idx="0">
-            <a:schemeClr val="accent1"/>
-          </a:effectRef>
-          <a:fontRef idx="minor">
-            <a:schemeClr val="tx1"/>
-          </a:fontRef>
-        </p:style>
-      </p:cxnSp>
-      <p:sp>
-        <p:nvSpPr>
-          <p:cNvPr id="21" name="Retângulo: Cantos Diagonais Arredondados 20">
-            <a:extLst>
-              <a:ext uri="{FF2B5EF4-FFF2-40B4-BE49-F238E27FC236}">
-                <a16:creationId xmlns:a16="http://schemas.microsoft.com/office/drawing/2014/main" id="{9E474DEE-43BC-4102-B9DD-812C7FFEDA9B}"/>
-              </a:ext>
-            </a:extLst>
-          </p:cNvPr>
-          <p:cNvSpPr/>
-          <p:nvPr/>
-        </p:nvSpPr>
-        <p:spPr>
-          <a:xfrm>
-            <a:off x="8275528" y="530605"/>
-            <a:ext cx="2567031" cy="530224"/>
-          </a:xfrm>
-          <a:prstGeom prst="round2DiagRect">
-            <a:avLst/>
-          </a:prstGeom>
-          <a:solidFill>
-            <a:schemeClr val="accent1">
-              <a:lumMod val="20000"/>
-              <a:lumOff val="80000"/>
-            </a:schemeClr>
-          </a:solidFill>
-        </p:spPr>
-        <p:style>
-          <a:lnRef idx="2">
-            <a:schemeClr val="accent1">
-              <a:shade val="50000"/>
-            </a:schemeClr>
-          </a:lnRef>
-          <a:fillRef idx="1">
-            <a:schemeClr val="accent1"/>
-          </a:fillRef>
-          <a:effectRef idx="0">
-            <a:schemeClr val="accent1"/>
-          </a:effectRef>
-          <a:fontRef idx="minor">
-            <a:schemeClr val="lt1"/>
-          </a:fontRef>
-        </p:style>
-        <p:txBody>
-          <a:bodyPr rtlCol="0" anchor="ctr"/>
-          <a:lstStyle/>
-          <a:p>
-            <a:r>
-              <a:rPr lang="pt-BR" sz="1000" dirty="0">
-                <a:solidFill>
-                  <a:schemeClr val="tx1"/>
-                </a:solidFill>
-                <a:latin typeface="Times New Roman" panose="02020603050405020304" pitchFamily="18" charset="0"/>
-                <a:cs typeface="Times New Roman" panose="02020603050405020304" pitchFamily="18" charset="0"/>
-              </a:rPr>
-              <a:t>Neste cenário, o Cliente irá interagir com a Área Comercial da WEG.</a:t>
-            </a:r>
-            <a:endParaRPr lang="pt-BR" sz="1100" dirty="0">
-              <a:solidFill>
-                <a:schemeClr val="tx1"/>
-              </a:solidFill>
-            </a:endParaRPr>
-          </a:p>
-        </p:txBody>
-      </p:sp>
-      <p:sp>
-        <p:nvSpPr>
-          <p:cNvPr id="23" name="Retângulo: Cantos Diagonais Arredondados 22">
-            <a:extLst>
-              <a:ext uri="{FF2B5EF4-FFF2-40B4-BE49-F238E27FC236}">
-                <a16:creationId xmlns:a16="http://schemas.microsoft.com/office/drawing/2014/main" id="{5061951D-B633-49FD-A16A-326B12734C70}"/>
-              </a:ext>
-            </a:extLst>
-          </p:cNvPr>
-          <p:cNvSpPr/>
-          <p:nvPr/>
-        </p:nvSpPr>
-        <p:spPr>
-          <a:xfrm>
-            <a:off x="8275528" y="5797171"/>
-            <a:ext cx="2567031" cy="645574"/>
-          </a:xfrm>
-          <a:prstGeom prst="round2DiagRect">
-            <a:avLst/>
-          </a:prstGeom>
-          <a:solidFill>
-            <a:schemeClr val="accent1">
-              <a:lumMod val="20000"/>
-              <a:lumOff val="80000"/>
-            </a:schemeClr>
-          </a:solidFill>
-        </p:spPr>
-        <p:style>
-          <a:lnRef idx="2">
-            <a:schemeClr val="accent1">
-              <a:shade val="50000"/>
-            </a:schemeClr>
-          </a:lnRef>
-          <a:fillRef idx="1">
-            <a:schemeClr val="accent1"/>
-          </a:fillRef>
-          <a:effectRef idx="0">
-            <a:schemeClr val="accent1"/>
-          </a:effectRef>
-          <a:fontRef idx="minor">
-            <a:schemeClr val="lt1"/>
-          </a:fontRef>
-        </p:style>
-        <p:txBody>
-          <a:bodyPr rtlCol="0" anchor="ctr"/>
-          <a:lstStyle/>
-          <a:p>
-            <a:r>
-              <a:rPr lang="pt-BR" sz="1000" dirty="0">
-                <a:solidFill>
-                  <a:schemeClr val="tx1"/>
-                </a:solidFill>
-                <a:latin typeface="Times New Roman" panose="02020603050405020304" pitchFamily="18" charset="0"/>
-                <a:cs typeface="Times New Roman" panose="02020603050405020304" pitchFamily="18" charset="0"/>
-              </a:rPr>
-              <a:t>Neste cenário, a Área Comercial deve ter a capacidade de avaliar o cliente para fazer um orçamento.</a:t>
-            </a:r>
-            <a:endParaRPr lang="pt-BR" sz="1100" dirty="0">
-              <a:solidFill>
-                <a:schemeClr val="tx1"/>
-              </a:solidFill>
-            </a:endParaRPr>
-          </a:p>
-        </p:txBody>
-      </p:sp>
-      <p:cxnSp>
-        <p:nvCxnSpPr>
-          <p:cNvPr id="27" name="Conector de Seta Reta 26">
-            <a:extLst>
-              <a:ext uri="{FF2B5EF4-FFF2-40B4-BE49-F238E27FC236}">
-                <a16:creationId xmlns:a16="http://schemas.microsoft.com/office/drawing/2014/main" id="{72283CA8-1D43-418E-B9EE-A5C5057DA409}"/>
-              </a:ext>
-            </a:extLst>
-          </p:cNvPr>
-          <p:cNvCxnSpPr>
-            <a:cxnSpLocks/>
-            <a:endCxn id="21" idx="1"/>
-          </p:cNvCxnSpPr>
-          <p:nvPr/>
-        </p:nvCxnSpPr>
-        <p:spPr>
-          <a:xfrm flipV="1">
-            <a:off x="8636100" y="1060829"/>
-            <a:ext cx="922944" cy="1732516"/>
-          </a:xfrm>
-          <a:prstGeom prst="straightConnector1">
-            <a:avLst/>
-          </a:prstGeom>
-          <a:ln>
-            <a:tailEnd type="triangle"/>
-          </a:ln>
-        </p:spPr>
-        <p:style>
-          <a:lnRef idx="1">
-            <a:schemeClr val="accent1"/>
-          </a:lnRef>
-          <a:fillRef idx="0">
-            <a:schemeClr val="accent1"/>
-          </a:fillRef>
-          <a:effectRef idx="0">
-            <a:schemeClr val="accent1"/>
-          </a:effectRef>
-          <a:fontRef idx="minor">
-            <a:schemeClr val="tx1"/>
-          </a:fontRef>
-        </p:style>
-      </p:cxnSp>
-      <p:cxnSp>
-        <p:nvCxnSpPr>
-          <p:cNvPr id="31" name="Conector de Seta Reta 30">
-            <a:extLst>
-              <a:ext uri="{FF2B5EF4-FFF2-40B4-BE49-F238E27FC236}">
-                <a16:creationId xmlns:a16="http://schemas.microsoft.com/office/drawing/2014/main" id="{9933A761-CA4B-4A0D-B03E-83403365082C}"/>
-              </a:ext>
-            </a:extLst>
-          </p:cNvPr>
-          <p:cNvCxnSpPr>
-            <a:cxnSpLocks/>
-          </p:cNvCxnSpPr>
-          <p:nvPr/>
-        </p:nvCxnSpPr>
-        <p:spPr>
-          <a:xfrm>
-            <a:off x="8187655" y="4421005"/>
-            <a:ext cx="256563" cy="1376166"/>
-          </a:xfrm>
-          <a:prstGeom prst="straightConnector1">
-            <a:avLst/>
-          </a:prstGeom>
-          <a:ln>
-            <a:tailEnd type="triangle"/>
-          </a:ln>
-        </p:spPr>
-        <p:style>
-          <a:lnRef idx="1">
-            <a:schemeClr val="accent1"/>
-          </a:lnRef>
-          <a:fillRef idx="0">
-            <a:schemeClr val="accent1"/>
-          </a:fillRef>
-          <a:effectRef idx="0">
-            <a:schemeClr val="accent1"/>
-          </a:effectRef>
-          <a:fontRef idx="minor">
-            <a:schemeClr val="tx1"/>
-          </a:fontRef>
-        </p:style>
-      </p:cxnSp>
-    </p:spTree>
-    <p:extLst>
-      <p:ext uri="{BB962C8B-B14F-4D97-AF65-F5344CB8AC3E}">
-        <p14:creationId xmlns:p14="http://schemas.microsoft.com/office/powerpoint/2010/main" val="2595377238"/>
-      </p:ext>
-    </p:extLst>
-  </p:cSld>
-  <p:clrMapOvr>
-    <a:masterClrMapping/>
-  </p:clrMapOvr>
-</p:sld>
-</file>
-
-<file path=ppt/slides/slide8.xml><?xml version="1.0" encoding="utf-8"?>
 <p:sld xmlns:a="http://schemas.openxmlformats.org/drawingml/2006/main" xmlns:r="http://schemas.openxmlformats.org/officeDocument/2006/relationships" xmlns:p="http://schemas.openxmlformats.org/presentationml/2006/main">
   <p:cSld>
     <p:spTree>

</xml_diff>